<commit_message>
Updated the slides to add Azure Storage
</commit_message>
<xml_diff>
--- a/slides/NoSQL.pptx
+++ b/slides/NoSQL.pptx
@@ -6,10 +6,10 @@
     <p:sldMasterId id="2147483656" r:id="rId2"/>
   </p:sldMasterIdLst>
   <p:notesMasterIdLst>
-    <p:notesMasterId r:id="rId27"/>
+    <p:notesMasterId r:id="rId28"/>
   </p:notesMasterIdLst>
   <p:handoutMasterIdLst>
-    <p:handoutMasterId r:id="rId28"/>
+    <p:handoutMasterId r:id="rId29"/>
   </p:handoutMasterIdLst>
   <p:sldIdLst>
     <p:sldId id="676" r:id="rId3"/>
@@ -22,25 +22,26 @@
     <p:sldId id="687" r:id="rId10"/>
     <p:sldId id="688" r:id="rId11"/>
     <p:sldId id="684" r:id="rId12"/>
-    <p:sldId id="685" r:id="rId13"/>
-    <p:sldId id="680" r:id="rId14"/>
-    <p:sldId id="681" r:id="rId15"/>
-    <p:sldId id="682" r:id="rId16"/>
-    <p:sldId id="686" r:id="rId17"/>
-    <p:sldId id="693" r:id="rId18"/>
-    <p:sldId id="690" r:id="rId19"/>
-    <p:sldId id="689" r:id="rId20"/>
-    <p:sldId id="691" r:id="rId21"/>
-    <p:sldId id="692" r:id="rId22"/>
-    <p:sldId id="694" r:id="rId23"/>
-    <p:sldId id="697" r:id="rId24"/>
-    <p:sldId id="695" r:id="rId25"/>
-    <p:sldId id="696" r:id="rId26"/>
+    <p:sldId id="701" r:id="rId13"/>
+    <p:sldId id="685" r:id="rId14"/>
+    <p:sldId id="680" r:id="rId15"/>
+    <p:sldId id="681" r:id="rId16"/>
+    <p:sldId id="682" r:id="rId17"/>
+    <p:sldId id="686" r:id="rId18"/>
+    <p:sldId id="693" r:id="rId19"/>
+    <p:sldId id="690" r:id="rId20"/>
+    <p:sldId id="689" r:id="rId21"/>
+    <p:sldId id="691" r:id="rId22"/>
+    <p:sldId id="692" r:id="rId23"/>
+    <p:sldId id="694" r:id="rId24"/>
+    <p:sldId id="697" r:id="rId25"/>
+    <p:sldId id="695" r:id="rId26"/>
+    <p:sldId id="696" r:id="rId27"/>
   </p:sldIdLst>
   <p:sldSz cx="9144000" cy="6858000" type="screen4x3"/>
   <p:notesSz cx="9601200" cy="7315200"/>
   <p:custDataLst>
-    <p:tags r:id="rId29"/>
+    <p:tags r:id="rId30"/>
   </p:custDataLst>
   <p:defaultTextStyle>
     <a:defPPr>
@@ -265,7 +266,7 @@
               <a:pPr>
                 <a:defRPr/>
               </a:pPr>
-              <a:t>9/9/2010 9:31 AM</a:t>
+              <a:t>9/9/2010 9:58 AM</a:t>
             </a:fld>
             <a:endParaRPr lang="en-US"/>
           </a:p>
@@ -475,7 +476,7 @@
               <a:pPr>
                 <a:defRPr/>
               </a:pPr>
-              <a:t>9/9/2010 9:31 AM</a:t>
+              <a:t>9/9/2010 9:58 AM</a:t>
             </a:fld>
             <a:endParaRPr lang="en-US"/>
           </a:p>
@@ -875,7 +876,7 @@
             <a:fld id="{645EDAD1-88E4-4536-AD95-0BFD82EC77E6}" type="datetime8">
               <a:rPr lang="en-US" smtClean="0"/>
               <a:pPr/>
-              <a:t>9/9/2010 9:31 AM</a:t>
+              <a:t>9/9/2010 9:58 AM</a:t>
             </a:fld>
             <a:endParaRPr lang="en-US" smtClean="0"/>
           </a:p>
@@ -7112,21 +7113,8 @@
                   <a:schemeClr val="tx2"/>
                 </a:solidFill>
               </a:rPr>
-              <a:t>Javier G. </a:t>
-            </a:r>
-            <a:r>
-              <a:rPr lang="en-US" b="1" dirty="0" smtClean="0">
-                <a:solidFill>
-                  <a:schemeClr val="tx2"/>
-                </a:solidFill>
-              </a:rPr>
-              <a:t>Lozano</a:t>
-            </a:r>
-            <a:endParaRPr lang="en-US" b="1" dirty="0" smtClean="0">
-              <a:solidFill>
-                <a:schemeClr val="tx2"/>
-              </a:solidFill>
-            </a:endParaRPr>
+              <a:t>Javier G. Lozano</a:t>
+            </a:r>
           </a:p>
         </p:txBody>
       </p:sp>
@@ -7200,8 +7188,8 @@
         </p:nvSpPr>
         <p:spPr>
           <a:xfrm>
-            <a:off x="381002" y="1417638"/>
-            <a:ext cx="8410575" cy="4524315"/>
+            <a:off x="381002" y="1417639"/>
+            <a:ext cx="8410575" cy="3933384"/>
           </a:xfrm>
         </p:spPr>
         <p:txBody>
@@ -7260,23 +7248,10 @@
             <a:endParaRPr lang="en-US" dirty="0" smtClean="0"/>
           </a:p>
           <a:p>
-            <a:pPr lvl="1"/>
-            <a:r>
-              <a:rPr lang="en-US" dirty="0" smtClean="0"/>
-              <a:t>Apache Cassandra – </a:t>
-            </a:r>
-            <a:r>
-              <a:rPr lang="en-US" dirty="0" err="1" smtClean="0"/>
-              <a:t>Facebook</a:t>
-            </a:r>
+            <a:pPr lvl="2">
+              <a:buNone/>
+            </a:pPr>
             <a:endParaRPr lang="en-US" dirty="0" smtClean="0"/>
-          </a:p>
-          <a:p>
-            <a:pPr lvl="2"/>
-            <a:r>
-              <a:rPr lang="en-US" dirty="0" smtClean="0"/>
-              <a:t>Inbox Search</a:t>
-            </a:r>
           </a:p>
           <a:p>
             <a:pPr lvl="1"/>
@@ -7369,7 +7344,7 @@
           <a:p>
             <a:r>
               <a:rPr lang="en-US" b="1" dirty="0" smtClean="0"/>
-              <a:t>Cache</a:t>
+              <a:t>Big Data</a:t>
             </a:r>
             <a:endParaRPr lang="en-US" b="1" dirty="0"/>
           </a:p>
@@ -7387,8 +7362,8 @@
         </p:nvSpPr>
         <p:spPr>
           <a:xfrm>
-            <a:off x="381002" y="1417638"/>
-            <a:ext cx="8410575" cy="4376583"/>
+            <a:off x="381002" y="1417639"/>
+            <a:ext cx="8410575" cy="4819781"/>
           </a:xfrm>
         </p:spPr>
         <p:txBody>
@@ -7397,63 +7372,73 @@
           <a:p>
             <a:r>
               <a:rPr lang="en-US" dirty="0" smtClean="0"/>
-              <a:t>Fully distributed</a:t>
-            </a:r>
-          </a:p>
-          <a:p>
+              <a:t>Current implementations</a:t>
+            </a:r>
+          </a:p>
+          <a:p>
+            <a:pPr lvl="1"/>
             <a:r>
               <a:rPr lang="en-US" dirty="0" smtClean="0"/>
-              <a:t>Typically volatile data</a:t>
-            </a:r>
-          </a:p>
-          <a:p>
+              <a:t>Apache </a:t>
+            </a:r>
             <a:r>
               <a:rPr lang="en-US" dirty="0" smtClean="0"/>
-              <a:t>Stored on RAM</a:t>
+              <a:t>Cassandra – </a:t>
+            </a:r>
+            <a:r>
+              <a:rPr lang="en-US" dirty="0" err="1" smtClean="0"/>
+              <a:t>Facebook</a:t>
+            </a:r>
+            <a:endParaRPr lang="en-US" dirty="0" smtClean="0"/>
+          </a:p>
+          <a:p>
+            <a:pPr lvl="2"/>
+            <a:r>
+              <a:rPr lang="en-US" dirty="0" smtClean="0"/>
+              <a:t>Inbox </a:t>
+            </a:r>
+            <a:r>
+              <a:rPr lang="en-US" dirty="0" smtClean="0"/>
+              <a:t>Search</a:t>
             </a:r>
           </a:p>
           <a:p>
             <a:pPr lvl="1"/>
             <a:r>
               <a:rPr lang="en-US" dirty="0" smtClean="0"/>
-              <a:t>No disk I/O</a:t>
-            </a:r>
-          </a:p>
-          <a:p>
+              <a:t>Azure Storage (Microsoft)</a:t>
+            </a:r>
+          </a:p>
+          <a:p>
+            <a:pPr lvl="2"/>
             <a:r>
               <a:rPr lang="en-US" dirty="0" smtClean="0"/>
-              <a:t>Current Implementation</a:t>
-            </a:r>
+              <a:t>Entity Table</a:t>
+            </a:r>
+          </a:p>
+          <a:p>
+            <a:pPr lvl="2"/>
+            <a:r>
+              <a:rPr lang="en-US" dirty="0" smtClean="0"/>
+              <a:t>Queuing</a:t>
+            </a:r>
+          </a:p>
+          <a:p>
+            <a:pPr lvl="2"/>
+            <a:r>
+              <a:rPr lang="en-US" dirty="0" smtClean="0"/>
+              <a:t>Blob</a:t>
+            </a:r>
+          </a:p>
+          <a:p>
+            <a:pPr lvl="2">
+              <a:buNone/>
+            </a:pPr>
+            <a:endParaRPr lang="en-US" dirty="0" smtClean="0"/>
           </a:p>
           <a:p>
             <a:pPr lvl="1"/>
-            <a:r>
-              <a:rPr lang="en-US" dirty="0" err="1" smtClean="0"/>
-              <a:t>Memcached</a:t>
-            </a:r>
-            <a:r>
-              <a:rPr lang="en-US" dirty="0" smtClean="0"/>
-              <a:t> – </a:t>
-            </a:r>
-            <a:r>
-              <a:rPr lang="en-US" dirty="0" err="1" smtClean="0"/>
-              <a:t>LiveJournal</a:t>
-            </a:r>
-            <a:r>
-              <a:rPr lang="en-US" dirty="0" smtClean="0"/>
-              <a:t>, YouTube, Twitter</a:t>
-            </a:r>
-          </a:p>
-          <a:p>
-            <a:pPr lvl="1"/>
-            <a:r>
-              <a:rPr lang="en-US" dirty="0" err="1" smtClean="0"/>
-              <a:t>AppFrabric</a:t>
-            </a:r>
-            <a:r>
-              <a:rPr lang="en-US" dirty="0" smtClean="0"/>
-              <a:t> – Microsoft</a:t>
-            </a:r>
+            <a:endParaRPr lang="en-US" dirty="0" smtClean="0"/>
           </a:p>
           <a:p>
             <a:pPr lvl="1"/>
@@ -7542,7 +7527,7 @@
           <a:p>
             <a:r>
               <a:rPr lang="en-US" b="1" dirty="0" smtClean="0"/>
-              <a:t>Document Store</a:t>
+              <a:t>Cache</a:t>
             </a:r>
             <a:endParaRPr lang="en-US" b="1" dirty="0"/>
           </a:p>
@@ -7561,7 +7546,7 @@
         <p:spPr>
           <a:xfrm>
             <a:off x="381002" y="1417638"/>
-            <a:ext cx="8410575" cy="3231654"/>
+            <a:ext cx="8410575" cy="4376583"/>
           </a:xfrm>
         </p:spPr>
         <p:txBody>
@@ -7570,132 +7555,67 @@
           <a:p>
             <a:r>
               <a:rPr lang="en-US" dirty="0" smtClean="0"/>
-              <a:t>No tables or records</a:t>
+              <a:t>Fully distributed</a:t>
             </a:r>
           </a:p>
           <a:p>
             <a:r>
               <a:rPr lang="en-US" dirty="0" smtClean="0"/>
-              <a:t>Each record is a ‘document’</a:t>
-            </a:r>
-          </a:p>
-          <a:p>
-            <a:pPr lvl="1">
-              <a:buNone/>
-            </a:pPr>
-            <a:r>
-              <a:rPr lang="en-US" sz="2400" b="1" dirty="0" smtClean="0">
-                <a:latin typeface="Consolas" pitchFamily="49" charset="0"/>
-                <a:cs typeface="Consolas" pitchFamily="49" charset="0"/>
-              </a:rPr>
-              <a:t>	</a:t>
-            </a:r>
-          </a:p>
-          <a:p>
-            <a:pPr lvl="1">
-              <a:buNone/>
-            </a:pPr>
-            <a:r>
-              <a:rPr lang="en-US" sz="2400" b="1" dirty="0" smtClean="0">
-                <a:latin typeface="Consolas" pitchFamily="49" charset="0"/>
-                <a:cs typeface="Consolas" pitchFamily="49" charset="0"/>
-              </a:rPr>
-              <a:t>	Id=123, </a:t>
-            </a:r>
-            <a:r>
-              <a:rPr lang="en-US" sz="2400" b="1" dirty="0" err="1" smtClean="0">
-                <a:latin typeface="Consolas" pitchFamily="49" charset="0"/>
-                <a:cs typeface="Consolas" pitchFamily="49" charset="0"/>
-              </a:rPr>
-              <a:t>FirstName</a:t>
-            </a:r>
-            <a:r>
-              <a:rPr lang="en-US" sz="2400" b="1" dirty="0" smtClean="0">
-                <a:latin typeface="Consolas" pitchFamily="49" charset="0"/>
-                <a:cs typeface="Consolas" pitchFamily="49" charset="0"/>
-              </a:rPr>
-              <a:t>=“John”, </a:t>
-            </a:r>
-            <a:r>
-              <a:rPr lang="en-US" sz="2400" b="1" dirty="0" err="1" smtClean="0">
-                <a:latin typeface="Consolas" pitchFamily="49" charset="0"/>
-                <a:cs typeface="Consolas" pitchFamily="49" charset="0"/>
-              </a:rPr>
-              <a:t>LastName</a:t>
-            </a:r>
-            <a:r>
-              <a:rPr lang="en-US" sz="2400" b="1" dirty="0" smtClean="0">
-                <a:latin typeface="Consolas" pitchFamily="49" charset="0"/>
-                <a:cs typeface="Consolas" pitchFamily="49" charset="0"/>
-              </a:rPr>
-              <a:t>=“Smith”</a:t>
-            </a:r>
-          </a:p>
-          <a:p>
-            <a:pPr lvl="1">
-              <a:buNone/>
-            </a:pPr>
-            <a:r>
-              <a:rPr lang="en-US" sz="2400" b="1" dirty="0" smtClean="0">
-                <a:latin typeface="Consolas" pitchFamily="49" charset="0"/>
-                <a:cs typeface="Consolas" pitchFamily="49" charset="0"/>
-              </a:rPr>
-              <a:t>	</a:t>
-            </a:r>
-          </a:p>
-          <a:p>
-            <a:pPr lvl="1">
-              <a:buNone/>
-            </a:pPr>
-            <a:r>
-              <a:rPr lang="en-US" sz="2400" b="1" dirty="0" smtClean="0">
-                <a:latin typeface="Consolas" pitchFamily="49" charset="0"/>
-                <a:cs typeface="Consolas" pitchFamily="49" charset="0"/>
-              </a:rPr>
-              <a:t>	Id=456, </a:t>
-            </a:r>
-            <a:r>
-              <a:rPr lang="en-US" sz="2400" b="1" dirty="0" err="1" smtClean="0">
-                <a:latin typeface="Consolas" pitchFamily="49" charset="0"/>
-                <a:cs typeface="Consolas" pitchFamily="49" charset="0"/>
-              </a:rPr>
-              <a:t>FirstName</a:t>
-            </a:r>
-            <a:r>
-              <a:rPr lang="en-US" sz="2400" b="1" dirty="0" smtClean="0">
-                <a:latin typeface="Consolas" pitchFamily="49" charset="0"/>
-                <a:cs typeface="Consolas" pitchFamily="49" charset="0"/>
-              </a:rPr>
-              <a:t>=“Jim”, </a:t>
-            </a:r>
-            <a:r>
-              <a:rPr lang="en-US" sz="2400" b="1" dirty="0" err="1" smtClean="0">
-                <a:latin typeface="Consolas" pitchFamily="49" charset="0"/>
-                <a:cs typeface="Consolas" pitchFamily="49" charset="0"/>
-              </a:rPr>
-              <a:t>LastName</a:t>
-            </a:r>
-            <a:r>
-              <a:rPr lang="en-US" sz="2400" b="1" dirty="0" smtClean="0">
-                <a:latin typeface="Consolas" pitchFamily="49" charset="0"/>
-                <a:cs typeface="Consolas" pitchFamily="49" charset="0"/>
-              </a:rPr>
-              <a:t>=“Jones”, Address=(Line1=“123 Some </a:t>
-            </a:r>
-            <a:r>
-              <a:rPr lang="en-US" sz="2400" b="1" dirty="0" err="1" smtClean="0">
-                <a:latin typeface="Consolas" pitchFamily="49" charset="0"/>
-                <a:cs typeface="Consolas" pitchFamily="49" charset="0"/>
-              </a:rPr>
-              <a:t>St”,State</a:t>
-            </a:r>
-            <a:r>
-              <a:rPr lang="en-US" sz="2400" b="1" dirty="0" smtClean="0">
-                <a:latin typeface="Consolas" pitchFamily="49" charset="0"/>
-                <a:cs typeface="Consolas" pitchFamily="49" charset="0"/>
-              </a:rPr>
-              <a:t>=“Iowa”)</a:t>
-            </a:r>
+              <a:t>Typically volatile data</a:t>
+            </a:r>
+          </a:p>
+          <a:p>
+            <a:r>
+              <a:rPr lang="en-US" dirty="0" smtClean="0"/>
+              <a:t>Stored on RAM</a:t>
+            </a:r>
+          </a:p>
+          <a:p>
+            <a:pPr lvl="1"/>
+            <a:r>
+              <a:rPr lang="en-US" dirty="0" smtClean="0"/>
+              <a:t>No disk I/O</a:t>
+            </a:r>
+          </a:p>
+          <a:p>
+            <a:r>
+              <a:rPr lang="en-US" dirty="0" smtClean="0"/>
+              <a:t>Current Implementation</a:t>
+            </a:r>
+          </a:p>
+          <a:p>
+            <a:pPr lvl="1"/>
+            <a:r>
+              <a:rPr lang="en-US" dirty="0" err="1" smtClean="0"/>
+              <a:t>Memcached</a:t>
+            </a:r>
+            <a:r>
+              <a:rPr lang="en-US" dirty="0" smtClean="0"/>
+              <a:t> – </a:t>
+            </a:r>
+            <a:r>
+              <a:rPr lang="en-US" dirty="0" err="1" smtClean="0"/>
+              <a:t>LiveJournal</a:t>
+            </a:r>
+            <a:r>
+              <a:rPr lang="en-US" dirty="0" smtClean="0"/>
+              <a:t>, YouTube, Twitter</a:t>
+            </a:r>
+          </a:p>
+          <a:p>
+            <a:pPr lvl="1"/>
+            <a:r>
+              <a:rPr lang="en-US" dirty="0" err="1" smtClean="0"/>
+              <a:t>AppFrabric</a:t>
+            </a:r>
+            <a:r>
+              <a:rPr lang="en-US" dirty="0" smtClean="0"/>
+              <a:t> – Microsoft</a:t>
+            </a:r>
+          </a:p>
+          <a:p>
+            <a:pPr lvl="1"/>
+            <a:endParaRPr lang="en-US" dirty="0" smtClean="0"/>
           </a:p>
         </p:txBody>
       </p:sp>
@@ -7799,7 +7719,7 @@
         <p:spPr>
           <a:xfrm>
             <a:off x="381002" y="1417638"/>
-            <a:ext cx="8410575" cy="1717393"/>
+            <a:ext cx="8410575" cy="3231654"/>
           </a:xfrm>
         </p:spPr>
         <p:txBody>
@@ -7808,23 +7728,131 @@
           <a:p>
             <a:r>
               <a:rPr lang="en-US" dirty="0" smtClean="0"/>
-              <a:t>Each record is a similar but different…</a:t>
-            </a:r>
-            <a:endParaRPr lang="en-US" sz="2400" b="1" dirty="0" smtClean="0">
-              <a:latin typeface="Consolas" pitchFamily="49" charset="0"/>
-              <a:cs typeface="Consolas" pitchFamily="49" charset="0"/>
-            </a:endParaRPr>
+              <a:t>No tables or records</a:t>
+            </a:r>
           </a:p>
           <a:p>
             <a:r>
               <a:rPr lang="en-US" dirty="0" smtClean="0"/>
-              <a:t>Only necessary data is stored</a:t>
-            </a:r>
-          </a:p>
-          <a:p>
-            <a:r>
-              <a:rPr lang="en-US" dirty="0" smtClean="0"/>
-              <a:t>No ‘empty’ data is needed</a:t>
+              <a:t>Each record is a ‘document’</a:t>
+            </a:r>
+          </a:p>
+          <a:p>
+            <a:pPr lvl="1">
+              <a:buNone/>
+            </a:pPr>
+            <a:r>
+              <a:rPr lang="en-US" sz="2400" b="1" dirty="0" smtClean="0">
+                <a:latin typeface="Consolas" pitchFamily="49" charset="0"/>
+                <a:cs typeface="Consolas" pitchFamily="49" charset="0"/>
+              </a:rPr>
+              <a:t>	</a:t>
+            </a:r>
+          </a:p>
+          <a:p>
+            <a:pPr lvl="1">
+              <a:buNone/>
+            </a:pPr>
+            <a:r>
+              <a:rPr lang="en-US" sz="2400" b="1" dirty="0" smtClean="0">
+                <a:latin typeface="Consolas" pitchFamily="49" charset="0"/>
+                <a:cs typeface="Consolas" pitchFamily="49" charset="0"/>
+              </a:rPr>
+              <a:t>	Id=123, </a:t>
+            </a:r>
+            <a:r>
+              <a:rPr lang="en-US" sz="2400" b="1" dirty="0" err="1" smtClean="0">
+                <a:latin typeface="Consolas" pitchFamily="49" charset="0"/>
+                <a:cs typeface="Consolas" pitchFamily="49" charset="0"/>
+              </a:rPr>
+              <a:t>FirstName</a:t>
+            </a:r>
+            <a:r>
+              <a:rPr lang="en-US" sz="2400" b="1" dirty="0" smtClean="0">
+                <a:latin typeface="Consolas" pitchFamily="49" charset="0"/>
+                <a:cs typeface="Consolas" pitchFamily="49" charset="0"/>
+              </a:rPr>
+              <a:t>=“John”, </a:t>
+            </a:r>
+            <a:r>
+              <a:rPr lang="en-US" sz="2400" b="1" dirty="0" err="1" smtClean="0">
+                <a:latin typeface="Consolas" pitchFamily="49" charset="0"/>
+                <a:cs typeface="Consolas" pitchFamily="49" charset="0"/>
+              </a:rPr>
+              <a:t>LastName</a:t>
+            </a:r>
+            <a:r>
+              <a:rPr lang="en-US" sz="2400" b="1" dirty="0" smtClean="0">
+                <a:latin typeface="Consolas" pitchFamily="49" charset="0"/>
+                <a:cs typeface="Consolas" pitchFamily="49" charset="0"/>
+              </a:rPr>
+              <a:t>=“Smith”</a:t>
+            </a:r>
+          </a:p>
+          <a:p>
+            <a:pPr lvl="1">
+              <a:buNone/>
+            </a:pPr>
+            <a:r>
+              <a:rPr lang="en-US" sz="2400" b="1" dirty="0" smtClean="0">
+                <a:latin typeface="Consolas" pitchFamily="49" charset="0"/>
+                <a:cs typeface="Consolas" pitchFamily="49" charset="0"/>
+              </a:rPr>
+              <a:t>	</a:t>
+            </a:r>
+          </a:p>
+          <a:p>
+            <a:pPr lvl="1">
+              <a:buNone/>
+            </a:pPr>
+            <a:r>
+              <a:rPr lang="en-US" sz="2400" b="1" dirty="0" smtClean="0">
+                <a:latin typeface="Consolas" pitchFamily="49" charset="0"/>
+                <a:cs typeface="Consolas" pitchFamily="49" charset="0"/>
+              </a:rPr>
+              <a:t>	Id=456, </a:t>
+            </a:r>
+            <a:r>
+              <a:rPr lang="en-US" sz="2400" b="1" dirty="0" err="1" smtClean="0">
+                <a:latin typeface="Consolas" pitchFamily="49" charset="0"/>
+                <a:cs typeface="Consolas" pitchFamily="49" charset="0"/>
+              </a:rPr>
+              <a:t>FirstName</a:t>
+            </a:r>
+            <a:r>
+              <a:rPr lang="en-US" sz="2400" b="1" dirty="0" smtClean="0">
+                <a:latin typeface="Consolas" pitchFamily="49" charset="0"/>
+                <a:cs typeface="Consolas" pitchFamily="49" charset="0"/>
+              </a:rPr>
+              <a:t>=“Jim”, </a:t>
+            </a:r>
+            <a:r>
+              <a:rPr lang="en-US" sz="2400" b="1" dirty="0" err="1" smtClean="0">
+                <a:latin typeface="Consolas" pitchFamily="49" charset="0"/>
+                <a:cs typeface="Consolas" pitchFamily="49" charset="0"/>
+              </a:rPr>
+              <a:t>LastName</a:t>
+            </a:r>
+            <a:r>
+              <a:rPr lang="en-US" sz="2400" b="1" dirty="0" smtClean="0">
+                <a:latin typeface="Consolas" pitchFamily="49" charset="0"/>
+                <a:cs typeface="Consolas" pitchFamily="49" charset="0"/>
+              </a:rPr>
+              <a:t>=“Jones”, Address=(Line1=“123 Some </a:t>
+            </a:r>
+            <a:r>
+              <a:rPr lang="en-US" sz="2400" b="1" dirty="0" err="1" smtClean="0">
+                <a:latin typeface="Consolas" pitchFamily="49" charset="0"/>
+                <a:cs typeface="Consolas" pitchFamily="49" charset="0"/>
+              </a:rPr>
+              <a:t>St”,State</a:t>
+            </a:r>
+            <a:r>
+              <a:rPr lang="en-US" sz="2400" b="1" dirty="0" smtClean="0">
+                <a:latin typeface="Consolas" pitchFamily="49" charset="0"/>
+                <a:cs typeface="Consolas" pitchFamily="49" charset="0"/>
+              </a:rPr>
+              <a:t>=“Iowa”)</a:t>
             </a:r>
           </a:p>
         </p:txBody>
@@ -7929,7 +7957,7 @@
         <p:spPr>
           <a:xfrm>
             <a:off x="381002" y="1417638"/>
-            <a:ext cx="8410575" cy="4302716"/>
+            <a:ext cx="8410575" cy="1717393"/>
           </a:xfrm>
         </p:spPr>
         <p:txBody>
@@ -7938,58 +7966,24 @@
           <a:p>
             <a:r>
               <a:rPr lang="en-US" dirty="0" smtClean="0"/>
-              <a:t>Can be easily extended later</a:t>
-            </a:r>
+              <a:t>Each record is a similar but different…</a:t>
+            </a:r>
+            <a:endParaRPr lang="en-US" sz="2400" b="1" dirty="0" smtClean="0">
+              <a:latin typeface="Consolas" pitchFamily="49" charset="0"/>
+              <a:cs typeface="Consolas" pitchFamily="49" charset="0"/>
+            </a:endParaRPr>
           </a:p>
           <a:p>
             <a:r>
               <a:rPr lang="en-US" dirty="0" smtClean="0"/>
-              <a:t>Leverages semi-structured data</a:t>
-            </a:r>
-          </a:p>
-          <a:p>
-            <a:pPr lvl="1"/>
+              <a:t>Only necessary data is stored</a:t>
+            </a:r>
+          </a:p>
+          <a:p>
             <a:r>
               <a:rPr lang="en-US" dirty="0" smtClean="0"/>
-              <a:t>XML</a:t>
-            </a:r>
-          </a:p>
-          <a:p>
-            <a:pPr lvl="1"/>
-            <a:r>
-              <a:rPr lang="en-US" dirty="0" smtClean="0"/>
-              <a:t>JSON/BISON</a:t>
-            </a:r>
-          </a:p>
-          <a:p>
-            <a:r>
-              <a:rPr lang="en-US" dirty="0" smtClean="0"/>
-              <a:t>Samples</a:t>
-            </a:r>
-          </a:p>
-          <a:p>
-            <a:pPr lvl="1"/>
-            <a:r>
-              <a:rPr lang="en-US" dirty="0" err="1" smtClean="0"/>
-              <a:t>CouchDB</a:t>
-            </a:r>
-            <a:endParaRPr lang="en-US" dirty="0" smtClean="0"/>
-          </a:p>
-          <a:p>
-            <a:pPr lvl="1"/>
-            <a:r>
-              <a:rPr lang="en-US" dirty="0" err="1" smtClean="0"/>
-              <a:t>MongoDB</a:t>
-            </a:r>
-            <a:endParaRPr lang="en-US" dirty="0" smtClean="0"/>
-          </a:p>
-          <a:p>
-            <a:pPr lvl="1"/>
-            <a:r>
-              <a:rPr lang="en-US" dirty="0" err="1" smtClean="0"/>
-              <a:t>RavenDB</a:t>
-            </a:r>
-            <a:endParaRPr lang="en-US" dirty="0" smtClean="0"/>
+              <a:t>No ‘empty’ data is needed</a:t>
+            </a:r>
           </a:p>
         </p:txBody>
       </p:sp>
@@ -8073,8 +8067,8 @@
           <a:lstStyle/>
           <a:p>
             <a:r>
-              <a:rPr lang="en-US" b="1" dirty="0" err="1" smtClean="0"/>
-              <a:t>CouchDB</a:t>
+              <a:rPr lang="en-US" b="1" dirty="0" smtClean="0"/>
+              <a:t>Document Store</a:t>
             </a:r>
             <a:endParaRPr lang="en-US" b="1" dirty="0"/>
           </a:p>
@@ -8093,7 +8087,7 @@
         <p:spPr>
           <a:xfrm>
             <a:off x="381002" y="1417638"/>
-            <a:ext cx="8410575" cy="2234458"/>
+            <a:ext cx="8410575" cy="4302716"/>
           </a:xfrm>
         </p:spPr>
         <p:txBody>
@@ -8102,35 +8096,58 @@
           <a:p>
             <a:r>
               <a:rPr lang="en-US" dirty="0" smtClean="0"/>
-              <a:t>Apache Project</a:t>
+              <a:t>Can be easily extended later</a:t>
+            </a:r>
+          </a:p>
+          <a:p>
+            <a:r>
+              <a:rPr lang="en-US" dirty="0" smtClean="0"/>
+              <a:t>Leverages semi-structured data</a:t>
             </a:r>
           </a:p>
           <a:p>
             <a:pPr lvl="1"/>
             <a:r>
               <a:rPr lang="en-US" dirty="0" smtClean="0"/>
-              <a:t>http://couchdb.apache.org</a:t>
-            </a:r>
-          </a:p>
-          <a:p>
+              <a:t>XML</a:t>
+            </a:r>
+          </a:p>
+          <a:p>
+            <a:pPr lvl="1"/>
             <a:r>
               <a:rPr lang="en-US" dirty="0" smtClean="0"/>
-              <a:t>Queried via JavaScript</a:t>
+              <a:t>JSON/BISON</a:t>
             </a:r>
           </a:p>
           <a:p>
             <a:r>
               <a:rPr lang="en-US" dirty="0" smtClean="0"/>
-              <a:t>Written </a:t>
-            </a:r>
+              <a:t>Samples</a:t>
+            </a:r>
+          </a:p>
+          <a:p>
+            <a:pPr lvl="1"/>
             <a:r>
               <a:rPr lang="en-US" dirty="0" err="1" smtClean="0"/>
-              <a:t>Erlang</a:t>
-            </a:r>
-            <a:r>
-              <a:rPr lang="en-US" dirty="0" smtClean="0"/>
-              <a:t> (functional language)</a:t>
-            </a:r>
+              <a:t>CouchDB</a:t>
+            </a:r>
+            <a:endParaRPr lang="en-US" dirty="0" smtClean="0"/>
+          </a:p>
+          <a:p>
+            <a:pPr lvl="1"/>
+            <a:r>
+              <a:rPr lang="en-US" dirty="0" err="1" smtClean="0"/>
+              <a:t>MongoDB</a:t>
+            </a:r>
+            <a:endParaRPr lang="en-US" dirty="0" smtClean="0"/>
+          </a:p>
+          <a:p>
+            <a:pPr lvl="1"/>
+            <a:r>
+              <a:rPr lang="en-US" dirty="0" err="1" smtClean="0"/>
+              <a:t>RavenDB</a:t>
+            </a:r>
+            <a:endParaRPr lang="en-US" dirty="0" smtClean="0"/>
           </a:p>
         </p:txBody>
       </p:sp>
@@ -8234,7 +8251,7 @@
         <p:spPr>
           <a:xfrm>
             <a:off x="381002" y="1417638"/>
-            <a:ext cx="8410575" cy="1643527"/>
+            <a:ext cx="8410575" cy="2234458"/>
           </a:xfrm>
         </p:spPr>
         <p:txBody>
@@ -8242,25 +8259,35 @@
           <a:lstStyle/>
           <a:p>
             <a:r>
+              <a:rPr lang="en-US" dirty="0" smtClean="0"/>
+              <a:t>Apache Project</a:t>
+            </a:r>
+          </a:p>
+          <a:p>
+            <a:pPr lvl="1"/>
+            <a:r>
+              <a:rPr lang="en-US" dirty="0" smtClean="0"/>
+              <a:t>http://couchdb.apache.org</a:t>
+            </a:r>
+          </a:p>
+          <a:p>
+            <a:r>
+              <a:rPr lang="en-US" dirty="0" smtClean="0"/>
+              <a:t>Queried via JavaScript</a:t>
+            </a:r>
+          </a:p>
+          <a:p>
+            <a:r>
+              <a:rPr lang="en-US" dirty="0" smtClean="0"/>
+              <a:t>Written </a:t>
+            </a:r>
+            <a:r>
               <a:rPr lang="en-US" dirty="0" err="1" smtClean="0"/>
-              <a:t>RESTful</a:t>
+              <a:t>Erlang</a:t>
             </a:r>
             <a:r>
               <a:rPr lang="en-US" dirty="0" smtClean="0"/>
-              <a:t> JSON API</a:t>
-            </a:r>
-          </a:p>
-          <a:p>
-            <a:pPr lvl="1"/>
-            <a:r>
-              <a:rPr lang="en-US" dirty="0" smtClean="0"/>
-              <a:t>It’s all HTTP!</a:t>
-            </a:r>
-          </a:p>
-          <a:p>
-            <a:r>
-              <a:rPr lang="en-US" dirty="0" smtClean="0"/>
-              <a:t>Sketchy support on Windows</a:t>
+              <a:t> (functional language)</a:t>
             </a:r>
           </a:p>
         </p:txBody>
@@ -8364,33 +8391,34 @@
         </p:nvSpPr>
         <p:spPr>
           <a:xfrm>
-            <a:off x="381002" y="3161235"/>
-            <a:ext cx="8410575" cy="1274195"/>
+            <a:off x="381002" y="1417638"/>
+            <a:ext cx="8410575" cy="1643527"/>
           </a:xfrm>
         </p:spPr>
         <p:txBody>
           <a:bodyPr/>
           <a:lstStyle/>
           <a:p>
-            <a:pPr algn="ctr">
-              <a:buNone/>
-            </a:pPr>
-            <a:r>
-              <a:rPr lang="en-US" sz="4800" b="1" dirty="0" err="1" smtClean="0"/>
-              <a:t>CouchDB</a:t>
-            </a:r>
-            <a:r>
-              <a:rPr lang="en-US" sz="4800" b="1" dirty="0" smtClean="0"/>
-              <a:t> with Divan</a:t>
-            </a:r>
-          </a:p>
-          <a:p>
-            <a:pPr algn="ctr">
-              <a:buNone/>
-            </a:pPr>
-            <a:r>
-              <a:rPr lang="en-US" sz="2800" b="1" dirty="0" smtClean="0"/>
-              <a:t>http://github.com/foretagsplatsen/Divan</a:t>
+            <a:r>
+              <a:rPr lang="en-US" dirty="0" err="1" smtClean="0"/>
+              <a:t>RESTful</a:t>
+            </a:r>
+            <a:r>
+              <a:rPr lang="en-US" dirty="0" smtClean="0"/>
+              <a:t> JSON API</a:t>
+            </a:r>
+          </a:p>
+          <a:p>
+            <a:pPr lvl="1"/>
+            <a:r>
+              <a:rPr lang="en-US" dirty="0" smtClean="0"/>
+              <a:t>It’s all HTTP!</a:t>
+            </a:r>
+          </a:p>
+          <a:p>
+            <a:r>
+              <a:rPr lang="en-US" dirty="0" smtClean="0"/>
+              <a:t>Sketchy support on Windows</a:t>
             </a:r>
           </a:p>
         </p:txBody>
@@ -8476,7 +8504,7 @@
           <a:p>
             <a:r>
               <a:rPr lang="en-US" b="1" dirty="0" err="1" smtClean="0"/>
-              <a:t>MongoDB</a:t>
+              <a:t>CouchDB</a:t>
             </a:r>
             <a:endParaRPr lang="en-US" b="1" dirty="0"/>
           </a:p>
@@ -8494,55 +8522,33 @@
         </p:nvSpPr>
         <p:spPr>
           <a:xfrm>
-            <a:off x="381002" y="1417638"/>
-            <a:ext cx="8410575" cy="3194721"/>
+            <a:off x="381002" y="3161235"/>
+            <a:ext cx="8410575" cy="1274195"/>
           </a:xfrm>
         </p:spPr>
         <p:txBody>
           <a:bodyPr/>
           <a:lstStyle/>
           <a:p>
-            <a:r>
-              <a:rPr lang="en-US" dirty="0" err="1" smtClean="0"/>
-              <a:t>Selfhosted</a:t>
-            </a:r>
-            <a:r>
-              <a:rPr lang="en-US" dirty="0" smtClean="0"/>
-              <a:t> Project</a:t>
-            </a:r>
-          </a:p>
-          <a:p>
-            <a:pPr lvl="1"/>
-            <a:r>
-              <a:rPr lang="en-US" dirty="0" smtClean="0"/>
-              <a:t>http://www.mongodb.org</a:t>
-            </a:r>
-          </a:p>
-          <a:p>
-            <a:pPr lvl="1"/>
-            <a:r>
-              <a:rPr lang="en-US" dirty="0" smtClean="0"/>
-              <a:t>“humongous”</a:t>
-            </a:r>
-          </a:p>
-          <a:p>
-            <a:r>
-              <a:rPr lang="en-US" dirty="0" smtClean="0"/>
-              <a:t>Bridge gap between…</a:t>
-            </a:r>
-          </a:p>
-          <a:p>
-            <a:pPr lvl="1"/>
-            <a:r>
-              <a:rPr lang="en-US" dirty="0" smtClean="0"/>
-              <a:t>Key/value stores (scalable)</a:t>
-            </a:r>
-          </a:p>
-          <a:p>
-            <a:pPr lvl="1"/>
-            <a:r>
-              <a:rPr lang="en-US" dirty="0" smtClean="0"/>
-              <a:t>RDBMS (querying)</a:t>
+            <a:pPr algn="ctr">
+              <a:buNone/>
+            </a:pPr>
+            <a:r>
+              <a:rPr lang="en-US" sz="4800" b="1" dirty="0" err="1" smtClean="0"/>
+              <a:t>CouchDB</a:t>
+            </a:r>
+            <a:r>
+              <a:rPr lang="en-US" sz="4800" b="1" dirty="0" smtClean="0"/>
+              <a:t> with Divan</a:t>
+            </a:r>
+          </a:p>
+          <a:p>
+            <a:pPr algn="ctr">
+              <a:buNone/>
+            </a:pPr>
+            <a:r>
+              <a:rPr lang="en-US" sz="2800" b="1" dirty="0" smtClean="0"/>
+              <a:t>http://github.com/foretagsplatsen/Divan</a:t>
             </a:r>
           </a:p>
         </p:txBody>
@@ -8647,7 +8653,7 @@
         <p:spPr>
           <a:xfrm>
             <a:off x="381002" y="1417638"/>
-            <a:ext cx="8410575" cy="3785652"/>
+            <a:ext cx="8410575" cy="3194721"/>
           </a:xfrm>
         </p:spPr>
         <p:txBody>
@@ -8655,47 +8661,47 @@
           <a:lstStyle/>
           <a:p>
             <a:r>
+              <a:rPr lang="en-US" dirty="0" err="1" smtClean="0"/>
+              <a:t>Selfhosted</a:t>
+            </a:r>
+            <a:r>
               <a:rPr lang="en-US" dirty="0" smtClean="0"/>
-              <a:t>JSON data store (flexible)</a:t>
-            </a:r>
-          </a:p>
-          <a:p>
+              <a:t> Project</a:t>
+            </a:r>
+          </a:p>
+          <a:p>
+            <a:pPr lvl="1"/>
             <a:r>
               <a:rPr lang="en-US" dirty="0" smtClean="0"/>
-              <a:t>Written C++ (portable)</a:t>
-            </a:r>
-          </a:p>
-          <a:p>
+              <a:t>http://www.mongodb.org</a:t>
+            </a:r>
+          </a:p>
+          <a:p>
+            <a:pPr lvl="1"/>
             <a:r>
               <a:rPr lang="en-US" dirty="0" smtClean="0"/>
-              <a:t>Used by</a:t>
+              <a:t>“humongous”</a:t>
+            </a:r>
+          </a:p>
+          <a:p>
+            <a:r>
+              <a:rPr lang="en-US" dirty="0" smtClean="0"/>
+              <a:t>Bridge gap between…</a:t>
             </a:r>
           </a:p>
           <a:p>
             <a:pPr lvl="1"/>
             <a:r>
               <a:rPr lang="en-US" dirty="0" smtClean="0"/>
-              <a:t>foursquare</a:t>
+              <a:t>Key/value stores (scalable)</a:t>
             </a:r>
           </a:p>
           <a:p>
             <a:pPr lvl="1"/>
             <a:r>
               <a:rPr lang="en-US" dirty="0" smtClean="0"/>
-              <a:t>bit.ly</a:t>
-            </a:r>
-          </a:p>
-          <a:p>
-            <a:pPr lvl="1"/>
-            <a:r>
-              <a:rPr lang="en-US" dirty="0" err="1" smtClean="0"/>
-              <a:t>github</a:t>
-            </a:r>
-            <a:endParaRPr lang="en-US" dirty="0" smtClean="0"/>
-          </a:p>
-          <a:p>
-            <a:pPr lvl="1"/>
-            <a:endParaRPr lang="en-US" dirty="0" smtClean="0"/>
+              <a:t>RDBMS (querying)</a:t>
+            </a:r>
           </a:p>
         </p:txBody>
       </p:sp>
@@ -8941,39 +8947,56 @@
         </p:nvSpPr>
         <p:spPr>
           <a:xfrm>
-            <a:off x="381002" y="3161235"/>
-            <a:ext cx="8410575" cy="1274195"/>
+            <a:off x="381002" y="1417638"/>
+            <a:ext cx="8410575" cy="3785652"/>
           </a:xfrm>
         </p:spPr>
         <p:txBody>
           <a:bodyPr/>
           <a:lstStyle/>
           <a:p>
-            <a:pPr algn="ctr">
-              <a:buNone/>
-            </a:pPr>
-            <a:r>
-              <a:rPr lang="en-US" sz="4800" b="1" dirty="0" err="1" smtClean="0"/>
-              <a:t>MongoDB</a:t>
-            </a:r>
-            <a:r>
-              <a:rPr lang="en-US" sz="4800" b="1" dirty="0" smtClean="0"/>
-              <a:t> with </a:t>
-            </a:r>
-            <a:r>
-              <a:rPr lang="en-US" sz="4800" b="1" dirty="0" err="1" smtClean="0"/>
-              <a:t>NoRM</a:t>
-            </a:r>
-            <a:endParaRPr lang="en-US" sz="4800" b="1" dirty="0" smtClean="0"/>
-          </a:p>
-          <a:p>
-            <a:pPr algn="ctr">
-              <a:buNone/>
-            </a:pPr>
-            <a:r>
-              <a:rPr lang="en-US" sz="2800" b="1" dirty="0" smtClean="0"/>
-              <a:t>http://normproject.org</a:t>
-            </a:r>
+            <a:r>
+              <a:rPr lang="en-US" dirty="0" smtClean="0"/>
+              <a:t>JSON data store (flexible)</a:t>
+            </a:r>
+          </a:p>
+          <a:p>
+            <a:r>
+              <a:rPr lang="en-US" dirty="0" smtClean="0"/>
+              <a:t>Written C++ (portable)</a:t>
+            </a:r>
+          </a:p>
+          <a:p>
+            <a:r>
+              <a:rPr lang="en-US" dirty="0" smtClean="0"/>
+              <a:t>Used by</a:t>
+            </a:r>
+          </a:p>
+          <a:p>
+            <a:pPr lvl="1"/>
+            <a:r>
+              <a:rPr lang="en-US" dirty="0" smtClean="0"/>
+              <a:t>foursquare</a:t>
+            </a:r>
+          </a:p>
+          <a:p>
+            <a:pPr lvl="1"/>
+            <a:r>
+              <a:rPr lang="en-US" dirty="0" smtClean="0"/>
+              <a:t>bit.ly</a:t>
+            </a:r>
+          </a:p>
+          <a:p>
+            <a:pPr lvl="1"/>
+            <a:r>
+              <a:rPr lang="en-US" dirty="0" err="1" smtClean="0"/>
+              <a:t>github</a:t>
+            </a:r>
+            <a:endParaRPr lang="en-US" dirty="0" smtClean="0"/>
+          </a:p>
+          <a:p>
+            <a:pPr lvl="1"/>
+            <a:endParaRPr lang="en-US" dirty="0" smtClean="0"/>
           </a:p>
         </p:txBody>
       </p:sp>
@@ -9058,7 +9081,7 @@
           <a:p>
             <a:r>
               <a:rPr lang="en-US" b="1" dirty="0" err="1" smtClean="0"/>
-              <a:t>RavenDB</a:t>
+              <a:t>MongoDB</a:t>
             </a:r>
             <a:endParaRPr lang="en-US" b="1" dirty="0"/>
           </a:p>
@@ -9076,75 +9099,38 @@
         </p:nvSpPr>
         <p:spPr>
           <a:xfrm>
-            <a:off x="381002" y="1417638"/>
-            <a:ext cx="8410575" cy="3194721"/>
+            <a:off x="381002" y="3161235"/>
+            <a:ext cx="8410575" cy="1274195"/>
           </a:xfrm>
         </p:spPr>
         <p:txBody>
           <a:bodyPr/>
           <a:lstStyle/>
           <a:p>
-            <a:r>
-              <a:rPr lang="en-US" dirty="0" smtClean="0"/>
-              <a:t>Hibernating Rhinos</a:t>
-            </a:r>
-          </a:p>
-          <a:p>
-            <a:pPr lvl="1"/>
-            <a:r>
-              <a:rPr lang="en-US" dirty="0" smtClean="0"/>
-              <a:t>http://ravendb.net</a:t>
-            </a:r>
-          </a:p>
-          <a:p>
-            <a:pPr lvl="1"/>
-            <a:r>
-              <a:rPr lang="en-US" dirty="0" smtClean="0"/>
-              <a:t>Oren </a:t>
-            </a:r>
-            <a:r>
-              <a:rPr lang="en-US" dirty="0" err="1" smtClean="0"/>
-              <a:t>Eini</a:t>
-            </a:r>
-            <a:r>
-              <a:rPr lang="en-US" dirty="0" smtClean="0"/>
-              <a:t> (</a:t>
-            </a:r>
-            <a:r>
-              <a:rPr lang="en-US" dirty="0" err="1" smtClean="0"/>
-              <a:t>Ayende</a:t>
-            </a:r>
-            <a:r>
-              <a:rPr lang="en-US" dirty="0" smtClean="0"/>
-              <a:t> </a:t>
-            </a:r>
-            <a:r>
-              <a:rPr lang="en-US" dirty="0" err="1" smtClean="0"/>
-              <a:t>Rahein</a:t>
-            </a:r>
-            <a:r>
-              <a:rPr lang="en-US" dirty="0" smtClean="0"/>
-              <a:t>)</a:t>
-            </a:r>
-          </a:p>
-          <a:p>
-            <a:pPr lvl="1"/>
-            <a:r>
-              <a:rPr lang="en-US" dirty="0" smtClean="0"/>
-              <a:t>Open Source</a:t>
-            </a:r>
-          </a:p>
-          <a:p>
-            <a:pPr lvl="1"/>
-            <a:r>
-              <a:rPr lang="en-US" dirty="0" smtClean="0"/>
-              <a:t>Commercial</a:t>
-            </a:r>
-          </a:p>
-          <a:p>
-            <a:r>
-              <a:rPr lang="en-US" dirty="0" smtClean="0"/>
-              <a:t>JSON data store (flexible)</a:t>
+            <a:pPr algn="ctr">
+              <a:buNone/>
+            </a:pPr>
+            <a:r>
+              <a:rPr lang="en-US" sz="4800" b="1" dirty="0" err="1" smtClean="0"/>
+              <a:t>MongoDB</a:t>
+            </a:r>
+            <a:r>
+              <a:rPr lang="en-US" sz="4800" b="1" dirty="0" smtClean="0"/>
+              <a:t> with </a:t>
+            </a:r>
+            <a:r>
+              <a:rPr lang="en-US" sz="4800" b="1" dirty="0" err="1" smtClean="0"/>
+              <a:t>NoRM</a:t>
+            </a:r>
+            <a:endParaRPr lang="en-US" sz="4800" b="1" dirty="0" smtClean="0"/>
+          </a:p>
+          <a:p>
+            <a:pPr algn="ctr">
+              <a:buNone/>
+            </a:pPr>
+            <a:r>
+              <a:rPr lang="en-US" sz="2800" b="1" dirty="0" smtClean="0"/>
+              <a:t>http://normproject.org</a:t>
             </a:r>
           </a:p>
         </p:txBody>
@@ -9249,7 +9235,7 @@
         <p:spPr>
           <a:xfrm>
             <a:off x="381002" y="1417638"/>
-            <a:ext cx="8410575" cy="2234458"/>
+            <a:ext cx="8410575" cy="3194721"/>
           </a:xfrm>
         </p:spPr>
         <p:txBody>
@@ -9258,30 +9244,65 @@
           <a:p>
             <a:r>
               <a:rPr lang="en-US" dirty="0" smtClean="0"/>
-              <a:t>Built around LINQ</a:t>
+              <a:t>Hibernating Rhinos</a:t>
             </a:r>
           </a:p>
           <a:p>
             <a:pPr lvl="1"/>
             <a:r>
+              <a:rPr lang="en-US" dirty="0" smtClean="0"/>
+              <a:t>http://ravendb.net</a:t>
+            </a:r>
+          </a:p>
+          <a:p>
+            <a:pPr lvl="1"/>
+            <a:r>
+              <a:rPr lang="en-US" dirty="0" smtClean="0"/>
+              <a:t>Oren </a:t>
+            </a:r>
+            <a:r>
               <a:rPr lang="en-US" dirty="0" err="1" smtClean="0"/>
-              <a:t>RESTful</a:t>
+              <a:t>Eini</a:t>
             </a:r>
             <a:r>
               <a:rPr lang="en-US" dirty="0" smtClean="0"/>
-              <a:t> API</a:t>
-            </a:r>
-          </a:p>
-          <a:p>
+              <a:t> (</a:t>
+            </a:r>
+            <a:r>
+              <a:rPr lang="en-US" dirty="0" err="1" smtClean="0"/>
+              <a:t>Ayende</a:t>
+            </a:r>
             <a:r>
               <a:rPr lang="en-US" dirty="0" smtClean="0"/>
-              <a:t>Written C# (great Windows support)</a:t>
-            </a:r>
-          </a:p>
-          <a:p>
+              <a:t> </a:t>
+            </a:r>
+            <a:r>
+              <a:rPr lang="en-US" dirty="0" err="1" smtClean="0"/>
+              <a:t>Rahein</a:t>
+            </a:r>
             <a:r>
               <a:rPr lang="en-US" dirty="0" smtClean="0"/>
-              <a:t>Fairly new</a:t>
+              <a:t>)</a:t>
+            </a:r>
+          </a:p>
+          <a:p>
+            <a:pPr lvl="1"/>
+            <a:r>
+              <a:rPr lang="en-US" dirty="0" smtClean="0"/>
+              <a:t>Open Source</a:t>
+            </a:r>
+          </a:p>
+          <a:p>
+            <a:pPr lvl="1"/>
+            <a:r>
+              <a:rPr lang="en-US" dirty="0" smtClean="0"/>
+              <a:t>Commercial</a:t>
+            </a:r>
+          </a:p>
+          <a:p>
+            <a:r>
+              <a:rPr lang="en-US" dirty="0" smtClean="0"/>
+              <a:t>JSON data store (flexible)</a:t>
             </a:r>
           </a:p>
         </p:txBody>
@@ -9385,30 +9406,40 @@
         </p:nvSpPr>
         <p:spPr>
           <a:xfrm>
-            <a:off x="381002" y="3161235"/>
-            <a:ext cx="8410575" cy="1274195"/>
+            <a:off x="381002" y="1417638"/>
+            <a:ext cx="8410575" cy="2234458"/>
           </a:xfrm>
         </p:spPr>
         <p:txBody>
           <a:bodyPr/>
           <a:lstStyle/>
           <a:p>
-            <a:pPr algn="ctr">
-              <a:buNone/>
-            </a:pPr>
-            <a:r>
-              <a:rPr lang="en-US" sz="4800" b="1" dirty="0" err="1" smtClean="0"/>
-              <a:t>RavenDB</a:t>
-            </a:r>
-            <a:endParaRPr lang="en-US" sz="4800" b="1" dirty="0" smtClean="0"/>
-          </a:p>
-          <a:p>
-            <a:pPr algn="ctr">
-              <a:buNone/>
-            </a:pPr>
-            <a:r>
-              <a:rPr lang="en-US" sz="2800" b="1" dirty="0" smtClean="0"/>
-              <a:t>http://ravendb.net</a:t>
+            <a:r>
+              <a:rPr lang="en-US" dirty="0" smtClean="0"/>
+              <a:t>Built around LINQ</a:t>
+            </a:r>
+          </a:p>
+          <a:p>
+            <a:pPr lvl="1"/>
+            <a:r>
+              <a:rPr lang="en-US" dirty="0" err="1" smtClean="0"/>
+              <a:t>RESTful</a:t>
+            </a:r>
+            <a:r>
+              <a:rPr lang="en-US" dirty="0" smtClean="0"/>
+              <a:t> API</a:t>
+            </a:r>
+          </a:p>
+          <a:p>
+            <a:r>
+              <a:rPr lang="en-US" dirty="0" smtClean="0"/>
+              <a:t>Written C# (great Windows support)</a:t>
+            </a:r>
+          </a:p>
+          <a:p>
+            <a:r>
+              <a:rPr lang="en-US" dirty="0" smtClean="0"/>
+              <a:t>Fairly new</a:t>
             </a:r>
           </a:p>
         </p:txBody>
@@ -9493,6 +9524,133 @@
           <a:lstStyle/>
           <a:p>
             <a:r>
+              <a:rPr lang="en-US" b="1" dirty="0" err="1" smtClean="0"/>
+              <a:t>RavenDB</a:t>
+            </a:r>
+            <a:endParaRPr lang="en-US" b="1" dirty="0"/>
+          </a:p>
+        </p:txBody>
+      </p:sp>
+      <p:sp>
+        <p:nvSpPr>
+          <p:cNvPr id="3" name="Content Placeholder 2"/>
+          <p:cNvSpPr>
+            <a:spLocks noGrp="1"/>
+          </p:cNvSpPr>
+          <p:nvPr>
+            <p:ph idx="1"/>
+          </p:nvPr>
+        </p:nvSpPr>
+        <p:spPr>
+          <a:xfrm>
+            <a:off x="381002" y="3161235"/>
+            <a:ext cx="8410575" cy="1274195"/>
+          </a:xfrm>
+        </p:spPr>
+        <p:txBody>
+          <a:bodyPr/>
+          <a:lstStyle/>
+          <a:p>
+            <a:pPr algn="ctr">
+              <a:buNone/>
+            </a:pPr>
+            <a:r>
+              <a:rPr lang="en-US" sz="4800" b="1" dirty="0" err="1" smtClean="0"/>
+              <a:t>RavenDB</a:t>
+            </a:r>
+            <a:endParaRPr lang="en-US" sz="4800" b="1" dirty="0" smtClean="0"/>
+          </a:p>
+          <a:p>
+            <a:pPr algn="ctr">
+              <a:buNone/>
+            </a:pPr>
+            <a:r>
+              <a:rPr lang="en-US" sz="2800" b="1" dirty="0" smtClean="0"/>
+              <a:t>http://ravendb.net</a:t>
+            </a:r>
+          </a:p>
+        </p:txBody>
+      </p:sp>
+      <p:sp>
+        <p:nvSpPr>
+          <p:cNvPr id="4" name="Slide Number Placeholder 3"/>
+          <p:cNvSpPr>
+            <a:spLocks noGrp="1"/>
+          </p:cNvSpPr>
+          <p:nvPr>
+            <p:ph type="sldNum" sz="quarter" idx="10"/>
+          </p:nvPr>
+        </p:nvSpPr>
+        <p:spPr/>
+        <p:txBody>
+          <a:bodyPr/>
+          <a:lstStyle/>
+          <a:p>
+            <a:pPr>
+              <a:defRPr/>
+            </a:pPr>
+            <a:fld id="{B63753EC-566D-40B0-951D-58F31B9256E5}" type="slidenum">
+              <a:rPr lang="en-US" smtClean="0"/>
+              <a:pPr>
+                <a:defRPr/>
+              </a:pPr>
+              <a:t>24</a:t>
+            </a:fld>
+            <a:endParaRPr lang="en-US"/>
+          </a:p>
+        </p:txBody>
+      </p:sp>
+    </p:spTree>
+  </p:cSld>
+  <p:clrMapOvr>
+    <a:masterClrMapping/>
+  </p:clrMapOvr>
+  <p:transition>
+    <p:fade/>
+  </p:transition>
+  <p:timing>
+    <p:tnLst>
+      <p:par>
+        <p:cTn id="1" dur="indefinite" restart="never" nodeType="tmRoot"/>
+      </p:par>
+    </p:tnLst>
+  </p:timing>
+</p:sld>
+</file>
+
+<file path=ppt/slides/slide25.xml><?xml version="1.0" encoding="utf-8"?>
+<p:sld xmlns:a="http://schemas.openxmlformats.org/drawingml/2006/main" xmlns:r="http://schemas.openxmlformats.org/officeDocument/2006/relationships" xmlns:p="http://schemas.openxmlformats.org/presentationml/2006/main">
+  <p:cSld>
+    <p:spTree>
+      <p:nvGrpSpPr>
+        <p:cNvPr id="1" name=""/>
+        <p:cNvGrpSpPr/>
+        <p:nvPr/>
+      </p:nvGrpSpPr>
+      <p:grpSpPr>
+        <a:xfrm>
+          <a:off x="0" y="0"/>
+          <a:ext cx="0" cy="0"/>
+          <a:chOff x="0" y="0"/>
+          <a:chExt cx="0" cy="0"/>
+        </a:xfrm>
+      </p:grpSpPr>
+      <p:sp>
+        <p:nvSpPr>
+          <p:cNvPr id="2" name="Title 1"/>
+          <p:cNvSpPr>
+            <a:spLocks noGrp="1"/>
+          </p:cNvSpPr>
+          <p:nvPr>
+            <p:ph type="title"/>
+          </p:nvPr>
+        </p:nvSpPr>
+        <p:spPr/>
+        <p:txBody>
+          <a:bodyPr/>
+          <a:lstStyle/>
+          <a:p>
+            <a:r>
               <a:rPr lang="en-US" b="1" dirty="0" smtClean="0"/>
               <a:t>Thanks!</a:t>
             </a:r>
@@ -9554,7 +9712,7 @@
               <a:pPr>
                 <a:defRPr/>
               </a:pPr>
-              <a:t>24</a:t>
+              <a:t>25</a:t>
             </a:fld>
             <a:endParaRPr lang="en-US"/>
           </a:p>
@@ -9666,17 +9824,8 @@
           <a:p>
             <a:r>
               <a:rPr lang="en-US" dirty="0" smtClean="0"/>
-              <a:t>http</a:t>
-            </a:r>
-            <a:r>
-              <a:rPr lang="en-US" dirty="0" smtClean="0"/>
-              <a:t>://</a:t>
-            </a:r>
-            <a:r>
-              <a:rPr lang="en-US" dirty="0" smtClean="0"/>
-              <a:t>github.com/lozanotek/nosql</a:t>
-            </a:r>
-            <a:endParaRPr lang="en-US" dirty="0" smtClean="0"/>
+              <a:t>http://github.com/lozanotek/nosql</a:t>
+            </a:r>
           </a:p>
         </p:txBody>
       </p:sp>
@@ -9796,11 +9945,7 @@
             </a:r>
             <a:r>
               <a:rPr lang="en-US" dirty="0" smtClean="0"/>
-              <a:t> dummyVariable1 = </a:t>
-            </a:r>
-            <a:r>
-              <a:rPr lang="en-US" dirty="0" smtClean="0"/>
-              <a:t>1;</a:t>
+              <a:t> dummyVariable1 = 1;</a:t>
             </a:r>
           </a:p>
           <a:p>
@@ -9822,7 +9967,6 @@
               <a:rPr lang="en-US" dirty="0" smtClean="0"/>
               <a:t>            </a:t>
             </a:r>
-            <a:endParaRPr lang="en-US" dirty="0" smtClean="0"/>
           </a:p>
           <a:p>
             <a:pPr>
@@ -9841,32 +9985,15 @@
             </a:br>
             <a:r>
               <a:rPr lang="en-US" dirty="0" smtClean="0"/>
-              <a:t>        </a:t>
-            </a:r>
-            <a:r>
-              <a:rPr lang="en-US" dirty="0" smtClean="0"/>
-              <a:t>+</a:t>
-            </a:r>
-            <a:r>
-              <a:rPr lang="en-US" dirty="0" smtClean="0"/>
-              <a:t> -+-+-+-+ + + + + + +-+-+-+-+-+</a:t>
+              <a:t>        + -+-+-+-+ + + + + + +-+-+-+-+-+</a:t>
             </a:r>
             <a:br>
               <a:rPr lang="en-US" dirty="0" smtClean="0"/>
             </a:br>
             <a:r>
               <a:rPr lang="en-US" dirty="0" smtClean="0"/>
-              <a:t>        </a:t>
-            </a:r>
-            <a:r>
-              <a:rPr lang="en-US" dirty="0" smtClean="0"/>
-              <a:t>dummyVariable2</a:t>
-            </a:r>
-            <a:r>
-              <a:rPr lang="en-US" dirty="0" smtClean="0"/>
-              <a:t>;</a:t>
-            </a:r>
-            <a:endParaRPr lang="en-US" dirty="0" smtClean="0"/>
+              <a:t>        dummyVariable2;</a:t>
+            </a:r>
           </a:p>
         </p:txBody>
       </p:sp>
@@ -9986,11 +10113,7 @@
             </a:r>
             <a:r>
               <a:rPr lang="en-US" dirty="0" smtClean="0"/>
-              <a:t> dummyVariable1 = </a:t>
-            </a:r>
-            <a:r>
-              <a:rPr lang="en-US" dirty="0" smtClean="0"/>
-              <a:t>1;</a:t>
+              <a:t> dummyVariable1 = 1;</a:t>
             </a:r>
           </a:p>
           <a:p>
@@ -10012,7 +10135,6 @@
               <a:rPr lang="en-US" dirty="0" smtClean="0"/>
               <a:t>            </a:t>
             </a:r>
-            <a:endParaRPr lang="en-US" dirty="0" smtClean="0"/>
           </a:p>
           <a:p>
             <a:pPr>
@@ -10031,28 +10153,15 @@
             </a:br>
             <a:r>
               <a:rPr lang="en-US" dirty="0" smtClean="0"/>
-              <a:t>        </a:t>
-            </a:r>
-            <a:r>
-              <a:rPr lang="en-US" dirty="0" smtClean="0"/>
-              <a:t>+</a:t>
-            </a:r>
-            <a:r>
-              <a:rPr lang="en-US" dirty="0" smtClean="0"/>
-              <a:t> -+-+-+-+ + + + + + +-+-+-+-+-+</a:t>
+              <a:t>        + -+-+-+-+ + + + + + +-+-+-+-+-+</a:t>
             </a:r>
             <a:br>
               <a:rPr lang="en-US" dirty="0" smtClean="0"/>
             </a:br>
             <a:r>
               <a:rPr lang="en-US" dirty="0" smtClean="0"/>
-              <a:t>        </a:t>
-            </a:r>
-            <a:r>
-              <a:rPr lang="en-US" dirty="0" smtClean="0"/>
-              <a:t>dummyVariable2;</a:t>
-            </a:r>
-            <a:endParaRPr lang="en-US" dirty="0" smtClean="0"/>
+              <a:t>        dummyVariable2;</a:t>
+            </a:r>
           </a:p>
           <a:p>
             <a:pPr>
@@ -10062,7 +10171,6 @@
               <a:rPr lang="en-US" dirty="0" smtClean="0"/>
               <a:t>YES!</a:t>
             </a:r>
-            <a:endParaRPr lang="en-US" dirty="0" smtClean="0"/>
           </a:p>
           <a:p>
             <a:pPr>
@@ -10072,7 +10180,6 @@
               <a:rPr lang="en-US" dirty="0" smtClean="0"/>
               <a:t>&gt;&gt; -2</a:t>
             </a:r>
-            <a:endParaRPr lang="en-US" dirty="0" smtClean="0"/>
           </a:p>
         </p:txBody>
       </p:sp>

</xml_diff>